<commit_message>
updated red trajectory indices to upper ones
</commit_message>
<xml_diff>
--- a/graphics/control_law_trajectories_v2.pptx
+++ b/graphics/control_law_trajectories_v2.pptx
@@ -3717,8 +3717,8 @@
           </a:p>
         </p:txBody>
       </p:sp>
-      <mc:AlternateContent xmlns:mc="http://schemas.openxmlformats.org/markup-compatibility/2006">
-        <mc:Choice xmlns:a14="http://schemas.microsoft.com/office/drawing/2010/main" Requires="a14">
+      <mc:AlternateContent xmlns:mc="http://schemas.openxmlformats.org/markup-compatibility/2006" xmlns:a14="http://schemas.microsoft.com/office/drawing/2010/main">
+        <mc:Choice Requires="a14">
           <p:sp>
             <p:nvSpPr>
               <p:cNvPr id="28" name="TextBox 27">
@@ -4829,7 +4829,7 @@
             </p:txBody>
           </p:sp>
         </mc:Choice>
-        <mc:Fallback>
+        <mc:Fallback xmlns="">
           <p:sp>
             <p:nvSpPr>
               <p:cNvPr id="28" name="TextBox 27">
@@ -4891,7 +4891,7 @@
             <p:spPr>
               <a:xfrm>
                 <a:off x="4874746" y="5778350"/>
-                <a:ext cx="1186030" cy="276999"/>
+                <a:ext cx="1186030" cy="283219"/>
               </a:xfrm>
               <a:prstGeom prst="rect">
                 <a:avLst/>
@@ -4965,8 +4965,8 @@
                         </a:rPr>
                         <m:t>(</m:t>
                       </m:r>
-                      <m:sSub>
-                        <m:sSubPr>
+                      <m:sSup>
+                        <m:sSupPr>
                           <m:ctrlPr>
                             <a:rPr lang="en-GB" b="1" i="1" smtClean="0">
                               <a:solidFill>
@@ -4975,7 +4975,7 @@
                               <a:latin typeface="Cambria Math" panose="02040503050406030204" pitchFamily="18" charset="0"/>
                             </a:rPr>
                           </m:ctrlPr>
-                        </m:sSubPr>
+                        </m:sSupPr>
                         <m:e>
                           <m:r>
                             <a:rPr lang="en-GB" b="1" i="1" smtClean="0">
@@ -4987,7 +4987,7 @@
                             <m:t>𝒔</m:t>
                           </m:r>
                         </m:e>
-                        <m:sub>
+                        <m:sup>
                           <m:r>
                             <a:rPr lang="en-GB" b="1" i="1" smtClean="0">
                               <a:solidFill>
@@ -4995,10 +4995,10 @@
                               </a:solidFill>
                               <a:latin typeface="Cambria Math" panose="02040503050406030204" pitchFamily="18" charset="0"/>
                             </a:rPr>
-                            <m:t>𝟏</m:t>
+                            <m:t>𝟑</m:t>
                           </m:r>
-                        </m:sub>
-                      </m:sSub>
+                        </m:sup>
+                      </m:sSup>
                       <m:r>
                         <a:rPr lang="en-GB" b="1" i="1" smtClean="0">
                           <a:solidFill>
@@ -5008,8 +5008,8 @@
                         </a:rPr>
                         <m:t>,</m:t>
                       </m:r>
-                      <m:sSub>
-                        <m:sSubPr>
+                      <m:sSup>
+                        <m:sSupPr>
                           <m:ctrlPr>
                             <a:rPr lang="en-GB" b="1" i="1" smtClean="0">
                               <a:solidFill>
@@ -5018,7 +5018,7 @@
                               <a:latin typeface="Cambria Math" panose="02040503050406030204" pitchFamily="18" charset="0"/>
                             </a:rPr>
                           </m:ctrlPr>
-                        </m:sSubPr>
+                        </m:sSupPr>
                         <m:e>
                           <m:r>
                             <a:rPr lang="en-GB" b="1" i="1" smtClean="0">
@@ -5030,7 +5030,7 @@
                             <m:t>𝒂</m:t>
                           </m:r>
                         </m:e>
-                        <m:sub>
+                        <m:sup>
                           <m:r>
                             <a:rPr lang="en-GB" b="1" i="1" smtClean="0">
                               <a:solidFill>
@@ -5038,10 +5038,10 @@
                               </a:solidFill>
                               <a:latin typeface="Cambria Math" panose="02040503050406030204" pitchFamily="18" charset="0"/>
                             </a:rPr>
-                            <m:t>𝟏</m:t>
+                            <m:t>𝟐</m:t>
                           </m:r>
-                        </m:sub>
-                      </m:sSub>
+                        </m:sup>
+                      </m:sSup>
                       <m:r>
                         <a:rPr lang="en-GB" b="1" i="1" smtClean="0">
                           <a:solidFill>
@@ -5081,7 +5081,7 @@
             <p:spPr>
               <a:xfrm>
                 <a:off x="4874746" y="5778350"/>
-                <a:ext cx="1186030" cy="276999"/>
+                <a:ext cx="1186030" cy="283219"/>
               </a:xfrm>
               <a:prstGeom prst="rect">
                 <a:avLst/>
@@ -5089,7 +5089,7 @@
               <a:blipFill>
                 <a:blip r:embed="rId3"/>
                 <a:stretch>
-                  <a:fillRect l="-1031" t="-2222" r="-7216" b="-35556"/>
+                  <a:fillRect l="-1031" t="-4348" r="-7216" b="-34783"/>
                 </a:stretch>
               </a:blipFill>
             </p:spPr>
@@ -5125,7 +5125,7 @@
             <p:spPr>
               <a:xfrm>
                 <a:off x="7774370" y="5766595"/>
-                <a:ext cx="1186029" cy="276999"/>
+                <a:ext cx="964944" cy="276999"/>
               </a:xfrm>
               <a:prstGeom prst="rect">
                 <a:avLst/>
@@ -5199,40 +5199,15 @@
                         </a:rPr>
                         <m:t>(</m:t>
                       </m:r>
-                      <m:sSub>
-                        <m:sSubPr>
-                          <m:ctrlPr>
-                            <a:rPr lang="en-GB" b="1" i="1" smtClean="0">
-                              <a:solidFill>
-                                <a:srgbClr val="FF0000"/>
-                              </a:solidFill>
-                              <a:latin typeface="Cambria Math" panose="02040503050406030204" pitchFamily="18" charset="0"/>
-                            </a:rPr>
-                          </m:ctrlPr>
-                        </m:sSubPr>
-                        <m:e>
-                          <m:r>
-                            <a:rPr lang="en-GB" b="1" i="1" smtClean="0">
-                              <a:solidFill>
-                                <a:srgbClr val="FF0000"/>
-                              </a:solidFill>
-                              <a:latin typeface="Cambria Math" panose="02040503050406030204" pitchFamily="18" charset="0"/>
-                            </a:rPr>
-                            <m:t>𝒔</m:t>
-                          </m:r>
-                        </m:e>
-                        <m:sub>
-                          <m:r>
-                            <a:rPr lang="en-GB" b="1" i="1" smtClean="0">
-                              <a:solidFill>
-                                <a:srgbClr val="FF0000"/>
-                              </a:solidFill>
-                              <a:latin typeface="Cambria Math" panose="02040503050406030204" pitchFamily="18" charset="0"/>
-                            </a:rPr>
-                            <m:t>𝟐</m:t>
-                          </m:r>
-                        </m:sub>
-                      </m:sSub>
+                      <m:r>
+                        <a:rPr lang="en-GB" b="1" i="1" smtClean="0">
+                          <a:solidFill>
+                            <a:srgbClr val="FF0000"/>
+                          </a:solidFill>
+                          <a:latin typeface="Cambria Math" panose="02040503050406030204" pitchFamily="18" charset="0"/>
+                        </a:rPr>
+                        <m:t>𝒔</m:t>
+                      </m:r>
                       <m:r>
                         <a:rPr lang="en-GB" b="1" i="1" smtClean="0">
                           <a:solidFill>
@@ -5242,40 +5217,15 @@
                         </a:rPr>
                         <m:t>,</m:t>
                       </m:r>
-                      <m:sSub>
-                        <m:sSubPr>
-                          <m:ctrlPr>
-                            <a:rPr lang="en-GB" b="1" i="1" smtClean="0">
-                              <a:solidFill>
-                                <a:srgbClr val="FF0000"/>
-                              </a:solidFill>
-                              <a:latin typeface="Cambria Math" panose="02040503050406030204" pitchFamily="18" charset="0"/>
-                            </a:rPr>
-                          </m:ctrlPr>
-                        </m:sSubPr>
-                        <m:e>
-                          <m:r>
-                            <a:rPr lang="en-GB" b="1" i="1" smtClean="0">
-                              <a:solidFill>
-                                <a:srgbClr val="FF0000"/>
-                              </a:solidFill>
-                              <a:latin typeface="Cambria Math" panose="02040503050406030204" pitchFamily="18" charset="0"/>
-                            </a:rPr>
-                            <m:t>𝒂</m:t>
-                          </m:r>
-                        </m:e>
-                        <m:sub>
-                          <m:r>
-                            <a:rPr lang="en-GB" b="1" i="1" smtClean="0">
-                              <a:solidFill>
-                                <a:srgbClr val="FF0000"/>
-                              </a:solidFill>
-                              <a:latin typeface="Cambria Math" panose="02040503050406030204" pitchFamily="18" charset="0"/>
-                            </a:rPr>
-                            <m:t>𝟐</m:t>
-                          </m:r>
-                        </m:sub>
-                      </m:sSub>
+                      <m:r>
+                        <a:rPr lang="en-GB" b="1" i="1" smtClean="0">
+                          <a:solidFill>
+                            <a:srgbClr val="FF0000"/>
+                          </a:solidFill>
+                          <a:latin typeface="Cambria Math" panose="02040503050406030204" pitchFamily="18" charset="0"/>
+                        </a:rPr>
+                        <m:t>𝒂</m:t>
+                      </m:r>
                       <m:r>
                         <a:rPr lang="en-GB" b="1" i="1" smtClean="0">
                           <a:solidFill>
@@ -5315,7 +5265,7 @@
             <p:spPr>
               <a:xfrm>
                 <a:off x="7774370" y="5766595"/>
-                <a:ext cx="1186029" cy="276999"/>
+                <a:ext cx="964944" cy="276999"/>
               </a:xfrm>
               <a:prstGeom prst="rect">
                 <a:avLst/>
@@ -5323,7 +5273,7 @@
               <a:blipFill>
                 <a:blip r:embed="rId4"/>
                 <a:stretch>
-                  <a:fillRect l="-1026" t="-2222" r="-6667" b="-35556"/>
+                  <a:fillRect l="-1258" t="-2222" r="-8176" b="-35556"/>
                 </a:stretch>
               </a:blipFill>
             </p:spPr>
@@ -5359,7 +5309,7 @@
             <p:spPr>
               <a:xfrm>
                 <a:off x="6524125" y="5762851"/>
-                <a:ext cx="1002326" cy="328360"/>
+                <a:ext cx="891783" cy="380104"/>
               </a:xfrm>
               <a:prstGeom prst="rect">
                 <a:avLst/>
@@ -5412,8 +5362,8 @@
                           </m:r>
                         </m:e>
                         <m:sub>
-                          <m:sSub>
-                            <m:sSubPr>
+                          <m:sSup>
+                            <m:sSupPr>
                               <m:ctrlPr>
                                 <a:rPr lang="en-GB" b="1" i="1" smtClean="0">
                                   <a:solidFill>
@@ -5422,7 +5372,7 @@
                                   <a:latin typeface="Cambria Math" panose="02040503050406030204" pitchFamily="18" charset="0"/>
                                 </a:rPr>
                               </m:ctrlPr>
-                            </m:sSubPr>
+                            </m:sSupPr>
                             <m:e>
                               <m:r>
                                 <a:rPr lang="en-GB" b="1" i="1" smtClean="0">
@@ -5434,7 +5384,7 @@
                                 <m:t>𝒔</m:t>
                               </m:r>
                             </m:e>
-                            <m:sub>
+                            <m:sup>
                               <m:r>
                                 <a:rPr lang="en-GB" b="1" i="1" smtClean="0">
                                   <a:solidFill>
@@ -5442,14 +5392,14 @@
                                   </a:solidFill>
                                   <a:latin typeface="Cambria Math" panose="02040503050406030204" pitchFamily="18" charset="0"/>
                                 </a:rPr>
-                                <m:t>𝟏</m:t>
+                                <m:t>𝟑</m:t>
                               </m:r>
-                            </m:sub>
-                          </m:sSub>
+                            </m:sup>
+                          </m:sSup>
                         </m:sub>
                         <m:sup>
-                          <m:sSub>
-                            <m:sSubPr>
+                          <m:sSup>
+                            <m:sSupPr>
                               <m:ctrlPr>
                                 <a:rPr lang="en-GB" b="1" i="1" smtClean="0">
                                   <a:solidFill>
@@ -5458,7 +5408,7 @@
                                   <a:latin typeface="Cambria Math" panose="02040503050406030204" pitchFamily="18" charset="0"/>
                                 </a:rPr>
                               </m:ctrlPr>
-                            </m:sSubPr>
+                            </m:sSupPr>
                             <m:e>
                               <m:r>
                                 <a:rPr lang="en-GB" b="1" i="1" smtClean="0">
@@ -5470,7 +5420,7 @@
                                 <m:t>𝒂</m:t>
                               </m:r>
                             </m:e>
-                            <m:sub>
+                            <m:sup>
                               <m:r>
                                 <a:rPr lang="en-GB" b="1" i="1" smtClean="0">
                                   <a:solidFill>
@@ -5478,10 +5428,10 @@
                                   </a:solidFill>
                                   <a:latin typeface="Cambria Math" panose="02040503050406030204" pitchFamily="18" charset="0"/>
                                 </a:rPr>
-                                <m:t>𝟏</m:t>
+                                <m:t>𝟐</m:t>
                               </m:r>
-                            </m:sub>
-                          </m:sSub>
+                            </m:sup>
+                          </m:sSup>
                         </m:sup>
                       </m:sSubSup>
                       <m:r>
@@ -5493,40 +5443,15 @@
                         </a:rPr>
                         <m:t>(</m:t>
                       </m:r>
-                      <m:sSub>
-                        <m:sSubPr>
-                          <m:ctrlPr>
-                            <a:rPr lang="en-GB" b="1" i="1" smtClean="0">
-                              <a:solidFill>
-                                <a:srgbClr val="FF0000"/>
-                              </a:solidFill>
-                              <a:latin typeface="Cambria Math" panose="02040503050406030204" pitchFamily="18" charset="0"/>
-                            </a:rPr>
-                          </m:ctrlPr>
-                        </m:sSubPr>
-                        <m:e>
-                          <m:r>
-                            <a:rPr lang="en-GB" b="1" i="1" smtClean="0">
-                              <a:solidFill>
-                                <a:srgbClr val="FF0000"/>
-                              </a:solidFill>
-                              <a:latin typeface="Cambria Math" panose="02040503050406030204" pitchFamily="18" charset="0"/>
-                            </a:rPr>
-                            <m:t>𝒔</m:t>
-                          </m:r>
-                        </m:e>
-                        <m:sub>
-                          <m:r>
-                            <a:rPr lang="en-GB" b="1" i="1" smtClean="0">
-                              <a:solidFill>
-                                <a:srgbClr val="FF0000"/>
-                              </a:solidFill>
-                              <a:latin typeface="Cambria Math" panose="02040503050406030204" pitchFamily="18" charset="0"/>
-                            </a:rPr>
-                            <m:t>𝟐</m:t>
-                          </m:r>
-                        </m:sub>
-                      </m:sSub>
+                      <m:r>
+                        <a:rPr lang="en-GB" b="1" i="1" smtClean="0">
+                          <a:solidFill>
+                            <a:srgbClr val="FF0000"/>
+                          </a:solidFill>
+                          <a:latin typeface="Cambria Math" panose="02040503050406030204" pitchFamily="18" charset="0"/>
+                        </a:rPr>
+                        <m:t>𝒔</m:t>
+                      </m:r>
                       <m:r>
                         <a:rPr lang="en-GB" b="1" i="1" smtClean="0">
                           <a:solidFill>
@@ -5566,7 +5491,7 @@
             <p:spPr>
               <a:xfrm>
                 <a:off x="6524125" y="5762851"/>
-                <a:ext cx="1002326" cy="328360"/>
+                <a:ext cx="891783" cy="380104"/>
               </a:xfrm>
               <a:prstGeom prst="rect">
                 <a:avLst/>
@@ -5574,7 +5499,7 @@
               <a:blipFill>
                 <a:blip r:embed="rId5"/>
                 <a:stretch>
-                  <a:fillRect l="-1212" r="-7879" b="-20370"/>
+                  <a:fillRect l="-1361" r="-8844" b="-15873"/>
                 </a:stretch>
               </a:blipFill>
             </p:spPr>
@@ -5958,8 +5883,8 @@
           </a:p>
         </p:txBody>
       </p:sp>
-      <mc:AlternateContent xmlns:mc="http://schemas.openxmlformats.org/markup-compatibility/2006">
-        <mc:Choice xmlns:a14="http://schemas.microsoft.com/office/drawing/2010/main" Requires="a14">
+      <mc:AlternateContent xmlns:mc="http://schemas.openxmlformats.org/markup-compatibility/2006" xmlns:a14="http://schemas.microsoft.com/office/drawing/2010/main">
+        <mc:Choice Requires="a14">
           <p:sp>
             <p:nvSpPr>
               <p:cNvPr id="39" name="TextBox 38">
@@ -6028,7 +5953,7 @@
             </p:txBody>
           </p:sp>
         </mc:Choice>
-        <mc:Fallback>
+        <mc:Fallback xmlns="">
           <p:sp>
             <p:nvSpPr>
               <p:cNvPr id="39" name="TextBox 38">
@@ -6073,8 +5998,8 @@
           </p:sp>
         </mc:Fallback>
       </mc:AlternateContent>
-      <mc:AlternateContent xmlns:mc="http://schemas.openxmlformats.org/markup-compatibility/2006">
-        <mc:Choice xmlns:a14="http://schemas.microsoft.com/office/drawing/2010/main" Requires="a14">
+      <mc:AlternateContent xmlns:mc="http://schemas.openxmlformats.org/markup-compatibility/2006" xmlns:a14="http://schemas.microsoft.com/office/drawing/2010/main">
+        <mc:Choice Requires="a14">
           <p:sp>
             <p:nvSpPr>
               <p:cNvPr id="41" name="TextBox 40">
@@ -6124,7 +6049,7 @@
             </p:txBody>
           </p:sp>
         </mc:Choice>
-        <mc:Fallback>
+        <mc:Fallback xmlns="">
           <p:sp>
             <p:nvSpPr>
               <p:cNvPr id="41" name="TextBox 40">
@@ -6169,8 +6094,8 @@
           </p:sp>
         </mc:Fallback>
       </mc:AlternateContent>
-      <mc:AlternateContent xmlns:mc="http://schemas.openxmlformats.org/markup-compatibility/2006">
-        <mc:Choice xmlns:a14="http://schemas.microsoft.com/office/drawing/2010/main" Requires="a14">
+      <mc:AlternateContent xmlns:mc="http://schemas.openxmlformats.org/markup-compatibility/2006" xmlns:a14="http://schemas.microsoft.com/office/drawing/2010/main">
+        <mc:Choice Requires="a14">
           <p:sp>
             <p:nvSpPr>
               <p:cNvPr id="44" name="TextBox 43">
@@ -6220,7 +6145,7 @@
             </p:txBody>
           </p:sp>
         </mc:Choice>
-        <mc:Fallback>
+        <mc:Fallback xmlns="">
           <p:sp>
             <p:nvSpPr>
               <p:cNvPr id="44" name="TextBox 43">
@@ -6473,8 +6398,8 @@
           </a:p>
         </p:txBody>
       </p:sp>
-      <mc:AlternateContent xmlns:mc="http://schemas.openxmlformats.org/markup-compatibility/2006">
-        <mc:Choice xmlns:a14="http://schemas.microsoft.com/office/drawing/2010/main" Requires="a14">
+      <mc:AlternateContent xmlns:mc="http://schemas.openxmlformats.org/markup-compatibility/2006" xmlns:a14="http://schemas.microsoft.com/office/drawing/2010/main">
+        <mc:Choice Requires="a14">
           <p:sp>
             <p:nvSpPr>
               <p:cNvPr id="53" name="TextBox 52">
@@ -6543,7 +6468,7 @@
             </p:txBody>
           </p:sp>
         </mc:Choice>
-        <mc:Fallback>
+        <mc:Fallback xmlns="">
           <p:sp>
             <p:nvSpPr>
               <p:cNvPr id="53" name="TextBox 52">
@@ -6703,8 +6628,8 @@
           </p:sp>
         </mc:Fallback>
       </mc:AlternateContent>
-      <mc:AlternateContent xmlns:mc="http://schemas.openxmlformats.org/markup-compatibility/2006">
-        <mc:Choice xmlns:a14="http://schemas.microsoft.com/office/drawing/2010/main" Requires="a14">
+      <mc:AlternateContent xmlns:mc="http://schemas.openxmlformats.org/markup-compatibility/2006" xmlns:a14="http://schemas.microsoft.com/office/drawing/2010/main">
+        <mc:Choice Requires="a14">
           <p:sp>
             <p:nvSpPr>
               <p:cNvPr id="56" name="TextBox 55">
@@ -6773,7 +6698,7 @@
             </p:txBody>
           </p:sp>
         </mc:Choice>
-        <mc:Fallback>
+        <mc:Fallback xmlns="">
           <p:sp>
             <p:nvSpPr>
               <p:cNvPr id="56" name="TextBox 55">
@@ -6818,8 +6743,8 @@
           </p:sp>
         </mc:Fallback>
       </mc:AlternateContent>
-      <mc:AlternateContent xmlns:mc="http://schemas.openxmlformats.org/markup-compatibility/2006">
-        <mc:Choice xmlns:a14="http://schemas.microsoft.com/office/drawing/2010/main" Requires="a14">
+      <mc:AlternateContent xmlns:mc="http://schemas.openxmlformats.org/markup-compatibility/2006" xmlns:a14="http://schemas.microsoft.com/office/drawing/2010/main">
+        <mc:Choice Requires="a14">
           <p:sp>
             <p:nvSpPr>
               <p:cNvPr id="102" name="TextBox 101">
@@ -6888,7 +6813,7 @@
             </p:txBody>
           </p:sp>
         </mc:Choice>
-        <mc:Fallback>
+        <mc:Fallback xmlns="">
           <p:sp>
             <p:nvSpPr>
               <p:cNvPr id="102" name="TextBox 101">
@@ -6933,8 +6858,8 @@
           </p:sp>
         </mc:Fallback>
       </mc:AlternateContent>
-      <mc:AlternateContent xmlns:mc="http://schemas.openxmlformats.org/markup-compatibility/2006">
-        <mc:Choice xmlns:a14="http://schemas.microsoft.com/office/drawing/2010/main" Requires="a14">
+      <mc:AlternateContent xmlns:mc="http://schemas.openxmlformats.org/markup-compatibility/2006" xmlns:a14="http://schemas.microsoft.com/office/drawing/2010/main">
+        <mc:Choice Requires="a14">
           <p:sp>
             <p:nvSpPr>
               <p:cNvPr id="103" name="TextBox 102">
@@ -7003,7 +6928,7 @@
             </p:txBody>
           </p:sp>
         </mc:Choice>
-        <mc:Fallback>
+        <mc:Fallback xmlns="">
           <p:sp>
             <p:nvSpPr>
               <p:cNvPr id="103" name="TextBox 102">
@@ -8237,8 +8162,8 @@
           </a:fontRef>
         </p:style>
       </p:cxnSp>
-      <mc:AlternateContent xmlns:mc="http://schemas.openxmlformats.org/markup-compatibility/2006">
-        <mc:Choice xmlns:a14="http://schemas.microsoft.com/office/drawing/2010/main" Requires="a14">
+      <mc:AlternateContent xmlns:mc="http://schemas.openxmlformats.org/markup-compatibility/2006" xmlns:a14="http://schemas.microsoft.com/office/drawing/2010/main">
+        <mc:Choice Requires="a14">
           <p:sp>
             <p:nvSpPr>
               <p:cNvPr id="91" name="TextBox 90">
@@ -8307,7 +8232,7 @@
             </p:txBody>
           </p:sp>
         </mc:Choice>
-        <mc:Fallback>
+        <mc:Fallback xmlns="">
           <p:sp>
             <p:nvSpPr>
               <p:cNvPr id="91" name="TextBox 90">
@@ -8352,8 +8277,8 @@
           </p:sp>
         </mc:Fallback>
       </mc:AlternateContent>
-      <mc:AlternateContent xmlns:mc="http://schemas.openxmlformats.org/markup-compatibility/2006">
-        <mc:Choice xmlns:a14="http://schemas.microsoft.com/office/drawing/2010/main" Requires="a14">
+      <mc:AlternateContent xmlns:mc="http://schemas.openxmlformats.org/markup-compatibility/2006" xmlns:a14="http://schemas.microsoft.com/office/drawing/2010/main">
+        <mc:Choice Requires="a14">
           <p:sp>
             <p:nvSpPr>
               <p:cNvPr id="92" name="TextBox 91">
@@ -8422,7 +8347,7 @@
             </p:txBody>
           </p:sp>
         </mc:Choice>
-        <mc:Fallback>
+        <mc:Fallback xmlns="">
           <p:sp>
             <p:nvSpPr>
               <p:cNvPr id="92" name="TextBox 91">
@@ -8467,8 +8392,8 @@
           </p:sp>
         </mc:Fallback>
       </mc:AlternateContent>
-      <mc:AlternateContent xmlns:mc="http://schemas.openxmlformats.org/markup-compatibility/2006">
-        <mc:Choice xmlns:a14="http://schemas.microsoft.com/office/drawing/2010/main" Requires="a14">
+      <mc:AlternateContent xmlns:mc="http://schemas.openxmlformats.org/markup-compatibility/2006" xmlns:a14="http://schemas.microsoft.com/office/drawing/2010/main">
+        <mc:Choice Requires="a14">
           <p:sp>
             <p:nvSpPr>
               <p:cNvPr id="94" name="TextBox 93">
@@ -8537,7 +8462,7 @@
             </p:txBody>
           </p:sp>
         </mc:Choice>
-        <mc:Fallback>
+        <mc:Fallback xmlns="">
           <p:sp>
             <p:nvSpPr>
               <p:cNvPr id="94" name="TextBox 93">
@@ -8582,8 +8507,8 @@
           </p:sp>
         </mc:Fallback>
       </mc:AlternateContent>
-      <mc:AlternateContent xmlns:mc="http://schemas.openxmlformats.org/markup-compatibility/2006">
-        <mc:Choice xmlns:a14="http://schemas.microsoft.com/office/drawing/2010/main" Requires="a14">
+      <mc:AlternateContent xmlns:mc="http://schemas.openxmlformats.org/markup-compatibility/2006" xmlns:a14="http://schemas.microsoft.com/office/drawing/2010/main">
+        <mc:Choice Requires="a14">
           <p:sp>
             <p:nvSpPr>
               <p:cNvPr id="108" name="TextBox 107">
@@ -8652,7 +8577,7 @@
             </p:txBody>
           </p:sp>
         </mc:Choice>
-        <mc:Fallback>
+        <mc:Fallback xmlns="">
           <p:sp>
             <p:nvSpPr>
               <p:cNvPr id="108" name="TextBox 107">
@@ -8697,8 +8622,8 @@
           </p:sp>
         </mc:Fallback>
       </mc:AlternateContent>
-      <mc:AlternateContent xmlns:mc="http://schemas.openxmlformats.org/markup-compatibility/2006">
-        <mc:Choice xmlns:a14="http://schemas.microsoft.com/office/drawing/2010/main" Requires="a14">
+      <mc:AlternateContent xmlns:mc="http://schemas.openxmlformats.org/markup-compatibility/2006" xmlns:a14="http://schemas.microsoft.com/office/drawing/2010/main">
+        <mc:Choice Requires="a14">
           <p:sp>
             <p:nvSpPr>
               <p:cNvPr id="109" name="TextBox 108">
@@ -8767,7 +8692,7 @@
             </p:txBody>
           </p:sp>
         </mc:Choice>
-        <mc:Fallback>
+        <mc:Fallback xmlns="">
           <p:sp>
             <p:nvSpPr>
               <p:cNvPr id="109" name="TextBox 108">
@@ -8812,8 +8737,8 @@
           </p:sp>
         </mc:Fallback>
       </mc:AlternateContent>
-      <mc:AlternateContent xmlns:mc="http://schemas.openxmlformats.org/markup-compatibility/2006">
-        <mc:Choice xmlns:a14="http://schemas.microsoft.com/office/drawing/2010/main" Requires="a14">
+      <mc:AlternateContent xmlns:mc="http://schemas.openxmlformats.org/markup-compatibility/2006" xmlns:a14="http://schemas.microsoft.com/office/drawing/2010/main">
+        <mc:Choice Requires="a14">
           <p:sp>
             <p:nvSpPr>
               <p:cNvPr id="110" name="TextBox 109">
@@ -8882,7 +8807,7 @@
             </p:txBody>
           </p:sp>
         </mc:Choice>
-        <mc:Fallback>
+        <mc:Fallback xmlns="">
           <p:sp>
             <p:nvSpPr>
               <p:cNvPr id="110" name="TextBox 109">
@@ -8927,8 +8852,8 @@
           </p:sp>
         </mc:Fallback>
       </mc:AlternateContent>
-      <mc:AlternateContent xmlns:mc="http://schemas.openxmlformats.org/markup-compatibility/2006">
-        <mc:Choice xmlns:a14="http://schemas.microsoft.com/office/drawing/2010/main" Requires="a14">
+      <mc:AlternateContent xmlns:mc="http://schemas.openxmlformats.org/markup-compatibility/2006" xmlns:a14="http://schemas.microsoft.com/office/drawing/2010/main">
+        <mc:Choice Requires="a14">
           <p:sp>
             <p:nvSpPr>
               <p:cNvPr id="113" name="TextBox 112">
@@ -8997,7 +8922,7 @@
             </p:txBody>
           </p:sp>
         </mc:Choice>
-        <mc:Fallback>
+        <mc:Fallback xmlns="">
           <p:sp>
             <p:nvSpPr>
               <p:cNvPr id="113" name="TextBox 112">
@@ -9042,8 +8967,8 @@
           </p:sp>
         </mc:Fallback>
       </mc:AlternateContent>
-      <mc:AlternateContent xmlns:mc="http://schemas.openxmlformats.org/markup-compatibility/2006">
-        <mc:Choice xmlns:a14="http://schemas.microsoft.com/office/drawing/2010/main" Requires="a14">
+      <mc:AlternateContent xmlns:mc="http://schemas.openxmlformats.org/markup-compatibility/2006" xmlns:a14="http://schemas.microsoft.com/office/drawing/2010/main">
+        <mc:Choice Requires="a14">
           <p:sp>
             <p:nvSpPr>
               <p:cNvPr id="114" name="TextBox 113">
@@ -9112,7 +9037,7 @@
             </p:txBody>
           </p:sp>
         </mc:Choice>
-        <mc:Fallback>
+        <mc:Fallback xmlns="">
           <p:sp>
             <p:nvSpPr>
               <p:cNvPr id="114" name="TextBox 113">
@@ -9157,8 +9082,8 @@
           </p:sp>
         </mc:Fallback>
       </mc:AlternateContent>
-      <mc:AlternateContent xmlns:mc="http://schemas.openxmlformats.org/markup-compatibility/2006">
-        <mc:Choice xmlns:a14="http://schemas.microsoft.com/office/drawing/2010/main" Requires="a14">
+      <mc:AlternateContent xmlns:mc="http://schemas.openxmlformats.org/markup-compatibility/2006" xmlns:a14="http://schemas.microsoft.com/office/drawing/2010/main">
+        <mc:Choice Requires="a14">
           <p:sp>
             <p:nvSpPr>
               <p:cNvPr id="116" name="TextBox 115">
@@ -9227,7 +9152,7 @@
             </p:txBody>
           </p:sp>
         </mc:Choice>
-        <mc:Fallback>
+        <mc:Fallback xmlns="">
           <p:sp>
             <p:nvSpPr>
               <p:cNvPr id="116" name="TextBox 115">
@@ -9272,8 +9197,8 @@
           </p:sp>
         </mc:Fallback>
       </mc:AlternateContent>
-      <mc:AlternateContent xmlns:mc="http://schemas.openxmlformats.org/markup-compatibility/2006">
-        <mc:Choice xmlns:a14="http://schemas.microsoft.com/office/drawing/2010/main" Requires="a14">
+      <mc:AlternateContent xmlns:mc="http://schemas.openxmlformats.org/markup-compatibility/2006" xmlns:a14="http://schemas.microsoft.com/office/drawing/2010/main">
+        <mc:Choice Requires="a14">
           <p:sp>
             <p:nvSpPr>
               <p:cNvPr id="147" name="TextBox 146">
@@ -9342,7 +9267,7 @@
             </p:txBody>
           </p:sp>
         </mc:Choice>
-        <mc:Fallback>
+        <mc:Fallback xmlns="">
           <p:sp>
             <p:nvSpPr>
               <p:cNvPr id="147" name="TextBox 146">
@@ -9404,7 +9329,7 @@
             <p:spPr>
               <a:xfrm>
                 <a:off x="1830847" y="5762851"/>
-                <a:ext cx="1069011" cy="276999"/>
+                <a:ext cx="1027333" cy="283219"/>
               </a:xfrm>
               <a:prstGeom prst="rect">
                 <a:avLst/>
@@ -9468,8 +9393,8 @@
                         </a:rPr>
                         <m:t>(</m:t>
                       </m:r>
-                      <m:sSub>
-                        <m:sSubPr>
+                      <m:sSup>
+                        <m:sSupPr>
                           <m:ctrlPr>
                             <a:rPr lang="en-GB" b="1" i="1" smtClean="0">
                               <a:solidFill>
@@ -9478,7 +9403,7 @@
                               <a:latin typeface="Cambria Math" panose="02040503050406030204" pitchFamily="18" charset="0"/>
                             </a:rPr>
                           </m:ctrlPr>
-                        </m:sSubPr>
+                        </m:sSupPr>
                         <m:e>
                           <m:r>
                             <a:rPr lang="en-GB" b="1" i="1" smtClean="0">
@@ -9490,7 +9415,7 @@
                             <m:t>𝒔</m:t>
                           </m:r>
                         </m:e>
-                        <m:sub>
+                        <m:sup>
                           <m:r>
                             <a:rPr lang="en-GB" b="1" i="1" smtClean="0">
                               <a:solidFill>
@@ -9498,10 +9423,10 @@
                               </a:solidFill>
                               <a:latin typeface="Cambria Math" panose="02040503050406030204" pitchFamily="18" charset="0"/>
                             </a:rPr>
-                            <m:t>𝟏</m:t>
+                            <m:t>′</m:t>
                           </m:r>
-                        </m:sub>
-                      </m:sSub>
+                        </m:sup>
+                      </m:sSup>
                       <m:r>
                         <a:rPr lang="en-GB" b="1" i="1" smtClean="0">
                           <a:solidFill>
@@ -9511,8 +9436,8 @@
                         </a:rPr>
                         <m:t>,</m:t>
                       </m:r>
-                      <m:sSub>
-                        <m:sSubPr>
+                      <m:sSup>
+                        <m:sSupPr>
                           <m:ctrlPr>
                             <a:rPr lang="en-GB" b="1" i="1" smtClean="0">
                               <a:solidFill>
@@ -9521,7 +9446,7 @@
                               <a:latin typeface="Cambria Math" panose="02040503050406030204" pitchFamily="18" charset="0"/>
                             </a:rPr>
                           </m:ctrlPr>
-                        </m:sSubPr>
+                        </m:sSupPr>
                         <m:e>
                           <m:r>
                             <a:rPr lang="en-GB" b="1" i="1" smtClean="0">
@@ -9533,7 +9458,7 @@
                             <m:t>𝒂</m:t>
                           </m:r>
                         </m:e>
-                        <m:sub>
+                        <m:sup>
                           <m:r>
                             <a:rPr lang="en-GB" b="1" i="1" smtClean="0">
                               <a:solidFill>
@@ -9543,8 +9468,8 @@
                             </a:rPr>
                             <m:t>𝟏</m:t>
                           </m:r>
-                        </m:sub>
-                      </m:sSub>
+                        </m:sup>
+                      </m:sSup>
                       <m:r>
                         <a:rPr lang="en-GB" b="1" i="1" smtClean="0">
                           <a:solidFill>
@@ -9584,7 +9509,7 @@
             <p:spPr>
               <a:xfrm>
                 <a:off x="1830847" y="5762851"/>
-                <a:ext cx="1069011" cy="276999"/>
+                <a:ext cx="1027333" cy="283219"/>
               </a:xfrm>
               <a:prstGeom prst="rect">
                 <a:avLst/>
@@ -9592,7 +9517,7 @@
               <a:blipFill>
                 <a:blip r:embed="rId31"/>
                 <a:stretch>
-                  <a:fillRect l="-4545" t="-2174" r="-7386" b="-32609"/>
+                  <a:fillRect l="-4734" t="-4255" r="-7692" b="-31915"/>
                 </a:stretch>
               </a:blipFill>
             </p:spPr>
@@ -9628,7 +9553,7 @@
             <p:spPr>
               <a:xfrm>
                 <a:off x="3142273" y="5751837"/>
-                <a:ext cx="1002326" cy="328360"/>
+                <a:ext cx="1002326" cy="370230"/>
               </a:xfrm>
               <a:prstGeom prst="rect">
                 <a:avLst/>
@@ -9681,8 +9606,8 @@
                           </m:r>
                         </m:e>
                         <m:sub>
-                          <m:sSub>
-                            <m:sSubPr>
+                          <m:sSup>
+                            <m:sSupPr>
                               <m:ctrlPr>
                                 <a:rPr lang="en-GB" b="1" i="1" smtClean="0">
                                   <a:solidFill>
@@ -9691,7 +9616,7 @@
                                   <a:latin typeface="Cambria Math" panose="02040503050406030204" pitchFamily="18" charset="0"/>
                                 </a:rPr>
                               </m:ctrlPr>
-                            </m:sSubPr>
+                            </m:sSupPr>
                             <m:e>
                               <m:r>
                                 <a:rPr lang="en-GB" b="1" i="1" smtClean="0">
@@ -9703,7 +9628,7 @@
                                 <m:t>𝒔</m:t>
                               </m:r>
                             </m:e>
-                            <m:sub>
+                            <m:sup>
                               <m:r>
                                 <a:rPr lang="en-GB" b="1" i="1" smtClean="0">
                                   <a:solidFill>
@@ -9711,14 +9636,14 @@
                                   </a:solidFill>
                                   <a:latin typeface="Cambria Math" panose="02040503050406030204" pitchFamily="18" charset="0"/>
                                 </a:rPr>
-                                <m:t>𝟏</m:t>
+                                <m:t>′</m:t>
                               </m:r>
-                            </m:sub>
-                          </m:sSub>
+                            </m:sup>
+                          </m:sSup>
                         </m:sub>
                         <m:sup>
-                          <m:sSub>
-                            <m:sSubPr>
+                          <m:sSup>
+                            <m:sSupPr>
                               <m:ctrlPr>
                                 <a:rPr lang="en-GB" b="1" i="1" smtClean="0">
                                   <a:solidFill>
@@ -9727,7 +9652,7 @@
                                   <a:latin typeface="Cambria Math" panose="02040503050406030204" pitchFamily="18" charset="0"/>
                                 </a:rPr>
                               </m:ctrlPr>
-                            </m:sSubPr>
+                            </m:sSupPr>
                             <m:e>
                               <m:r>
                                 <a:rPr lang="en-GB" b="1" i="1" smtClean="0">
@@ -9739,7 +9664,7 @@
                                 <m:t>𝒂</m:t>
                               </m:r>
                             </m:e>
-                            <m:sub>
+                            <m:sup>
                               <m:r>
                                 <a:rPr lang="en-GB" b="1" i="1" smtClean="0">
                                   <a:solidFill>
@@ -9749,8 +9674,8 @@
                                 </a:rPr>
                                 <m:t>𝟏</m:t>
                               </m:r>
-                            </m:sub>
-                          </m:sSub>
+                            </m:sup>
+                          </m:sSup>
                         </m:sup>
                       </m:sSubSup>
                       <m:r>
@@ -9762,8 +9687,8 @@
                         </a:rPr>
                         <m:t>(</m:t>
                       </m:r>
-                      <m:sSub>
-                        <m:sSubPr>
+                      <m:sSup>
+                        <m:sSupPr>
                           <m:ctrlPr>
                             <a:rPr lang="en-GB" b="1" i="1" smtClean="0">
                               <a:solidFill>
@@ -9772,7 +9697,7 @@
                               <a:latin typeface="Cambria Math" panose="02040503050406030204" pitchFamily="18" charset="0"/>
                             </a:rPr>
                           </m:ctrlPr>
-                        </m:sSubPr>
+                        </m:sSupPr>
                         <m:e>
                           <m:r>
                             <a:rPr lang="en-GB" b="1" i="1" smtClean="0">
@@ -9784,7 +9709,7 @@
                             <m:t>𝒔</m:t>
                           </m:r>
                         </m:e>
-                        <m:sub>
+                        <m:sup>
                           <m:r>
                             <a:rPr lang="en-GB" b="1" i="1" smtClean="0">
                               <a:solidFill>
@@ -9792,10 +9717,10 @@
                               </a:solidFill>
                               <a:latin typeface="Cambria Math" panose="02040503050406030204" pitchFamily="18" charset="0"/>
                             </a:rPr>
-                            <m:t>𝟐</m:t>
+                            <m:t>𝟑</m:t>
                           </m:r>
-                        </m:sub>
-                      </m:sSub>
+                        </m:sup>
+                      </m:sSup>
                       <m:r>
                         <a:rPr lang="en-GB" b="1" i="1" smtClean="0">
                           <a:solidFill>
@@ -9835,7 +9760,7 @@
             <p:spPr>
               <a:xfrm>
                 <a:off x="3142273" y="5751837"/>
-                <a:ext cx="1002326" cy="328360"/>
+                <a:ext cx="1002326" cy="370230"/>
               </a:xfrm>
               <a:prstGeom prst="rect">
                 <a:avLst/>
@@ -9843,7 +9768,7 @@
               <a:blipFill>
                 <a:blip r:embed="rId32"/>
                 <a:stretch>
-                  <a:fillRect l="-1212" r="-7879" b="-22642"/>
+                  <a:fillRect l="-1212" r="-7879" b="-21667"/>
                 </a:stretch>
               </a:blipFill>
             </p:spPr>

</xml_diff>